<commit_message>
:sparkles: Added OSINT easy and Forensic medium
</commit_message>
<xml_diff>
--- a/Papierkram/NeulandCTF.pptx
+++ b/Papierkram/NeulandCTF.pptx
@@ -264,6 +264,11 @@
         <p15:guide id="1" pos="5311">
           <p15:clr>
             <a:srgbClr val="EA4335"/>
+          </p15:clr>
+        </p15:guide>
+        <p15:guide id="2" orient="horz" pos="1620">
+          <p15:clr>
+            <a:srgbClr val="A4A3A4"/>
           </p15:clr>
         </p15:guide>
       </p15:sldGuideLst>
@@ -21739,132 +21744,6 @@
           <a:chExt cx="0" cy="0"/>
         </a:xfrm>
       </p:grpSpPr>
-      <p:pic>
-        <p:nvPicPr>
-          <p:cNvPr id="7" name="Grafik 6" descr="Ein Bild, das Text, Geschirr enthält.&#10;&#10;Automatisch generierte Beschreibung">
-            <a:extLst>
-              <a:ext uri="{FF2B5EF4-FFF2-40B4-BE49-F238E27FC236}">
-                <a16:creationId xmlns:a16="http://schemas.microsoft.com/office/drawing/2014/main" id="{2627572B-59F3-4A19-BF9C-B4EA94525D46}"/>
-              </a:ext>
-            </a:extLst>
-          </p:cNvPr>
-          <p:cNvPicPr>
-            <a:picLocks noChangeAspect="1"/>
-          </p:cNvPicPr>
-          <p:nvPr/>
-        </p:nvPicPr>
-        <p:blipFill>
-          <a:blip r:embed="rId2"/>
-          <a:stretch>
-            <a:fillRect/>
-          </a:stretch>
-        </p:blipFill>
-        <p:spPr>
-          <a:xfrm>
-            <a:off x="1364253" y="2317502"/>
-            <a:ext cx="3017073" cy="1178544"/>
-          </a:xfrm>
-          <a:prstGeom prst="rect">
-            <a:avLst/>
-          </a:prstGeom>
-        </p:spPr>
-      </p:pic>
-      <p:pic>
-        <p:nvPicPr>
-          <p:cNvPr id="4" name="Grafik 3">
-            <a:extLst>
-              <a:ext uri="{FF2B5EF4-FFF2-40B4-BE49-F238E27FC236}">
-                <a16:creationId xmlns:a16="http://schemas.microsoft.com/office/drawing/2014/main" id="{288FF52E-FC84-4E12-8EDC-F3F7FD4BB69F}"/>
-              </a:ext>
-            </a:extLst>
-          </p:cNvPr>
-          <p:cNvPicPr>
-            <a:picLocks noChangeAspect="1"/>
-          </p:cNvPicPr>
-          <p:nvPr/>
-        </p:nvPicPr>
-        <p:blipFill>
-          <a:blip r:embed="rId3">
-            <a:extLst>
-              <a:ext uri="{96DAC541-7B7A-43D3-8B79-37D633B846F1}">
-                <asvg:svgBlip xmlns:asvg="http://schemas.microsoft.com/office/drawing/2016/SVG/main" r:embed="rId4"/>
-              </a:ext>
-            </a:extLst>
-          </a:blip>
-          <a:stretch>
-            <a:fillRect/>
-          </a:stretch>
-        </p:blipFill>
-        <p:spPr>
-          <a:xfrm>
-            <a:off x="1364253" y="436245"/>
-            <a:ext cx="3975012" cy="1170556"/>
-          </a:xfrm>
-          <a:prstGeom prst="rect">
-            <a:avLst/>
-          </a:prstGeom>
-        </p:spPr>
-      </p:pic>
-      <p:pic>
-        <p:nvPicPr>
-          <p:cNvPr id="5" name="Grafik 4" descr="Ein Bild, das Text enthält.&#10;&#10;Automatisch generierte Beschreibung">
-            <a:extLst>
-              <a:ext uri="{FF2B5EF4-FFF2-40B4-BE49-F238E27FC236}">
-                <a16:creationId xmlns:a16="http://schemas.microsoft.com/office/drawing/2014/main" id="{DDF8A2B4-6C4C-4114-BF0F-E47C4D1BF8D0}"/>
-              </a:ext>
-            </a:extLst>
-          </p:cNvPr>
-          <p:cNvPicPr>
-            <a:picLocks noChangeAspect="1"/>
-          </p:cNvPicPr>
-          <p:nvPr/>
-        </p:nvPicPr>
-        <p:blipFill>
-          <a:blip r:embed="rId5"/>
-          <a:stretch>
-            <a:fillRect/>
-          </a:stretch>
-        </p:blipFill>
-        <p:spPr>
-          <a:xfrm>
-            <a:off x="4179821" y="1701222"/>
-            <a:ext cx="4443953" cy="856059"/>
-          </a:xfrm>
-          <a:prstGeom prst="rect">
-            <a:avLst/>
-          </a:prstGeom>
-        </p:spPr>
-      </p:pic>
-      <p:pic>
-        <p:nvPicPr>
-          <p:cNvPr id="6" name="Grafik 5" descr="Ein Bild, das Text enthält.&#10;&#10;Automatisch generierte Beschreibung">
-            <a:extLst>
-              <a:ext uri="{FF2B5EF4-FFF2-40B4-BE49-F238E27FC236}">
-                <a16:creationId xmlns:a16="http://schemas.microsoft.com/office/drawing/2014/main" id="{0EFBA2F9-FA8E-4DA7-B065-DECA6287CE5F}"/>
-              </a:ext>
-            </a:extLst>
-          </p:cNvPr>
-          <p:cNvPicPr>
-            <a:picLocks noChangeAspect="1"/>
-          </p:cNvPicPr>
-          <p:nvPr/>
-        </p:nvPicPr>
-        <p:blipFill>
-          <a:blip r:embed="rId6"/>
-          <a:stretch>
-            <a:fillRect/>
-          </a:stretch>
-        </p:blipFill>
-        <p:spPr>
-          <a:xfrm>
-            <a:off x="5024337" y="3329859"/>
-            <a:ext cx="3684068" cy="811931"/>
-          </a:xfrm>
-          <a:prstGeom prst="rect">
-            <a:avLst/>
-          </a:prstGeom>
-        </p:spPr>
-      </p:pic>
     </p:spTree>
     <p:extLst>
       <p:ext uri="{BB962C8B-B14F-4D97-AF65-F5344CB8AC3E}">
@@ -22025,7 +21904,7 @@
                 </a:solidFill>
                 <a:latin typeface="Play" panose="020B0604020202020204" charset="0"/>
               </a:rPr>
-              <a:t>02.04.2022 von 10 bis 18 Uhr an der THI</a:t>
+              <a:t>03.12.2022 von 10 bis 18 Uhr an der THI</a:t>
             </a:r>
           </a:p>
         </p:txBody>

</xml_diff>